<commit_message>
Add 8 novos user storys
</commit_message>
<xml_diff>
--- a/Projeto SIX MIND/Documentação/User Story - Six Minds.pptx
+++ b/Projeto SIX MIND/Documentação/User Story - Six Minds.pptx
@@ -6,6 +6,7 @@
   </p:sldMasterIdLst>
   <p:sldIdLst>
     <p:sldId id="256" r:id="rId2"/>
+    <p:sldId id="257" r:id="rId3"/>
   </p:sldIdLst>
   <p:sldSz cx="12192000" cy="6858000"/>
   <p:notesSz cx="6858000" cy="9144000"/>
@@ -104,6 +105,11 @@
       </a:defRPr>
     </a:lvl9pPr>
   </p:defaultTextStyle>
+  <p:extLst>
+    <p:ext uri="{EFAFB233-063F-42B5-8137-9DF3F51BA10A}">
+      <p15:sldGuideLst xmlns:p15="http://schemas.microsoft.com/office/powerpoint/2012/main"/>
+    </p:ext>
+  </p:extLst>
 </p:presentation>
 </file>
 
@@ -262,7 +268,7 @@
           <a:p>
             <a:fld id="{D03501A8-2AC6-4575-83BF-B2066DEA3A2F}" type="datetimeFigureOut">
               <a:rPr lang="pt-BR" smtClean="0"/>
-              <a:t>31/08/2020</a:t>
+              <a:t>01/09/2020</a:t>
             </a:fld>
             <a:endParaRPr lang="pt-BR"/>
           </a:p>
@@ -460,7 +466,7 @@
           <a:p>
             <a:fld id="{D03501A8-2AC6-4575-83BF-B2066DEA3A2F}" type="datetimeFigureOut">
               <a:rPr lang="pt-BR" smtClean="0"/>
-              <a:t>31/08/2020</a:t>
+              <a:t>01/09/2020</a:t>
             </a:fld>
             <a:endParaRPr lang="pt-BR"/>
           </a:p>
@@ -668,7 +674,7 @@
           <a:p>
             <a:fld id="{D03501A8-2AC6-4575-83BF-B2066DEA3A2F}" type="datetimeFigureOut">
               <a:rPr lang="pt-BR" smtClean="0"/>
-              <a:t>31/08/2020</a:t>
+              <a:t>01/09/2020</a:t>
             </a:fld>
             <a:endParaRPr lang="pt-BR"/>
           </a:p>
@@ -866,7 +872,7 @@
           <a:p>
             <a:fld id="{D03501A8-2AC6-4575-83BF-B2066DEA3A2F}" type="datetimeFigureOut">
               <a:rPr lang="pt-BR" smtClean="0"/>
-              <a:t>31/08/2020</a:t>
+              <a:t>01/09/2020</a:t>
             </a:fld>
             <a:endParaRPr lang="pt-BR"/>
           </a:p>
@@ -1141,7 +1147,7 @@
           <a:p>
             <a:fld id="{D03501A8-2AC6-4575-83BF-B2066DEA3A2F}" type="datetimeFigureOut">
               <a:rPr lang="pt-BR" smtClean="0"/>
-              <a:t>31/08/2020</a:t>
+              <a:t>01/09/2020</a:t>
             </a:fld>
             <a:endParaRPr lang="pt-BR"/>
           </a:p>
@@ -1406,7 +1412,7 @@
           <a:p>
             <a:fld id="{D03501A8-2AC6-4575-83BF-B2066DEA3A2F}" type="datetimeFigureOut">
               <a:rPr lang="pt-BR" smtClean="0"/>
-              <a:t>31/08/2020</a:t>
+              <a:t>01/09/2020</a:t>
             </a:fld>
             <a:endParaRPr lang="pt-BR"/>
           </a:p>
@@ -1818,7 +1824,7 @@
           <a:p>
             <a:fld id="{D03501A8-2AC6-4575-83BF-B2066DEA3A2F}" type="datetimeFigureOut">
               <a:rPr lang="pt-BR" smtClean="0"/>
-              <a:t>31/08/2020</a:t>
+              <a:t>01/09/2020</a:t>
             </a:fld>
             <a:endParaRPr lang="pt-BR"/>
           </a:p>
@@ -1959,7 +1965,7 @@
           <a:p>
             <a:fld id="{D03501A8-2AC6-4575-83BF-B2066DEA3A2F}" type="datetimeFigureOut">
               <a:rPr lang="pt-BR" smtClean="0"/>
-              <a:t>31/08/2020</a:t>
+              <a:t>01/09/2020</a:t>
             </a:fld>
             <a:endParaRPr lang="pt-BR"/>
           </a:p>
@@ -2072,7 +2078,7 @@
           <a:p>
             <a:fld id="{D03501A8-2AC6-4575-83BF-B2066DEA3A2F}" type="datetimeFigureOut">
               <a:rPr lang="pt-BR" smtClean="0"/>
-              <a:t>31/08/2020</a:t>
+              <a:t>01/09/2020</a:t>
             </a:fld>
             <a:endParaRPr lang="pt-BR"/>
           </a:p>
@@ -2383,7 +2389,7 @@
           <a:p>
             <a:fld id="{D03501A8-2AC6-4575-83BF-B2066DEA3A2F}" type="datetimeFigureOut">
               <a:rPr lang="pt-BR" smtClean="0"/>
-              <a:t>31/08/2020</a:t>
+              <a:t>01/09/2020</a:t>
             </a:fld>
             <a:endParaRPr lang="pt-BR"/>
           </a:p>
@@ -2671,7 +2677,7 @@
           <a:p>
             <a:fld id="{D03501A8-2AC6-4575-83BF-B2066DEA3A2F}" type="datetimeFigureOut">
               <a:rPr lang="pt-BR" smtClean="0"/>
-              <a:t>31/08/2020</a:t>
+              <a:t>01/09/2020</a:t>
             </a:fld>
             <a:endParaRPr lang="pt-BR"/>
           </a:p>
@@ -2912,7 +2918,7 @@
           <a:p>
             <a:fld id="{D03501A8-2AC6-4575-83BF-B2066DEA3A2F}" type="datetimeFigureOut">
               <a:rPr lang="pt-BR" smtClean="0"/>
-              <a:t>31/08/2020</a:t>
+              <a:t>01/09/2020</a:t>
             </a:fld>
             <a:endParaRPr lang="pt-BR"/>
           </a:p>
@@ -3391,7 +3397,15 @@
               <a:pPr algn="ctr"/>
               <a:r>
                 <a:rPr lang="pt-BR" dirty="0"/>
-                <a:t>Eu enquanto usuário quero informações sobre minha safra para tomadas decisões</a:t>
+                <a:t>Eu enquanto usuário quero informações </a:t>
+              </a:r>
+              <a:r>
+                <a:rPr lang="pt-BR" dirty="0" smtClean="0"/>
+                <a:t>gráficas para </a:t>
+              </a:r>
+              <a:r>
+                <a:rPr lang="pt-BR" dirty="0"/>
+                <a:t>tomadas decisões</a:t>
               </a:r>
             </a:p>
           </p:txBody>
@@ -3411,7 +3425,7 @@
             <p:nvPr/>
           </p:nvPicPr>
           <p:blipFill>
-            <a:blip r:embed="rId2">
+            <a:blip r:embed="rId2" cstate="hqprint">
               <a:extLst>
                 <a:ext uri="{28A0092B-C50C-407E-A947-70E740481C1C}">
                   <a14:useLocalDpi xmlns:a14="http://schemas.microsoft.com/office/drawing/2010/main" val="0"/>
@@ -3526,7 +3540,7 @@
             <p:nvPr/>
           </p:nvPicPr>
           <p:blipFill>
-            <a:blip r:embed="rId2">
+            <a:blip r:embed="rId2" cstate="hqprint">
               <a:extLst>
                 <a:ext uri="{28A0092B-C50C-407E-A947-70E740481C1C}">
                   <a14:useLocalDpi xmlns:a14="http://schemas.microsoft.com/office/drawing/2010/main" val="0"/>
@@ -3641,7 +3655,7 @@
             <p:nvPr/>
           </p:nvPicPr>
           <p:blipFill>
-            <a:blip r:embed="rId2">
+            <a:blip r:embed="rId2" cstate="hqprint">
               <a:extLst>
                 <a:ext uri="{28A0092B-C50C-407E-A947-70E740481C1C}">
                   <a14:useLocalDpi xmlns:a14="http://schemas.microsoft.com/office/drawing/2010/main" val="0"/>
@@ -3756,7 +3770,7 @@
             <p:nvPr/>
           </p:nvPicPr>
           <p:blipFill>
-            <a:blip r:embed="rId2">
+            <a:blip r:embed="rId2" cstate="hqprint">
               <a:extLst>
                 <a:ext uri="{28A0092B-C50C-407E-A947-70E740481C1C}">
                   <a14:useLocalDpi xmlns:a14="http://schemas.microsoft.com/office/drawing/2010/main" val="0"/>
@@ -3803,7 +3817,7 @@
         </p:nvGrpSpPr>
         <p:grpSpPr>
           <a:xfrm>
-            <a:off x="1768655" y="3429000"/>
+            <a:off x="3418110" y="3417977"/>
             <a:ext cx="2367643" cy="2791165"/>
             <a:chOff x="293914" y="196964"/>
             <a:chExt cx="2367643" cy="2791165"/>
@@ -3871,7 +3885,7 @@
             <p:nvPr/>
           </p:nvPicPr>
           <p:blipFill>
-            <a:blip r:embed="rId2">
+            <a:blip r:embed="rId2" cstate="hqprint">
               <a:extLst>
                 <a:ext uri="{28A0092B-C50C-407E-A947-70E740481C1C}">
                   <a14:useLocalDpi xmlns:a14="http://schemas.microsoft.com/office/drawing/2010/main" val="0"/>
@@ -3918,7 +3932,7 @@
         </p:nvGrpSpPr>
         <p:grpSpPr>
           <a:xfrm>
-            <a:off x="4933676" y="3429000"/>
+            <a:off x="6607626" y="3417977"/>
             <a:ext cx="2367643" cy="2791165"/>
             <a:chOff x="293914" y="196964"/>
             <a:chExt cx="2367643" cy="2791165"/>
@@ -3986,7 +4000,7 @@
             <p:nvPr/>
           </p:nvPicPr>
           <p:blipFill>
-            <a:blip r:embed="rId2">
+            <a:blip r:embed="rId2" cstate="hqprint">
               <a:extLst>
                 <a:ext uri="{28A0092B-C50C-407E-A947-70E740481C1C}">
                   <a14:useLocalDpi xmlns:a14="http://schemas.microsoft.com/office/drawing/2010/main" val="0"/>
@@ -4033,7 +4047,7 @@
         </p:nvGrpSpPr>
         <p:grpSpPr>
           <a:xfrm>
-            <a:off x="8098695" y="3429000"/>
+            <a:off x="9530443" y="3418590"/>
             <a:ext cx="2367643" cy="2791165"/>
             <a:chOff x="293914" y="196964"/>
             <a:chExt cx="2367643" cy="2791165"/>
@@ -4101,7 +4115,7 @@
             <p:nvPr/>
           </p:nvPicPr>
           <p:blipFill>
-            <a:blip r:embed="rId2">
+            <a:blip r:embed="rId2" cstate="hqprint">
               <a:extLst>
                 <a:ext uri="{28A0092B-C50C-407E-A947-70E740481C1C}">
                   <a14:useLocalDpi xmlns:a14="http://schemas.microsoft.com/office/drawing/2010/main" val="0"/>
@@ -4134,10 +4148,1186 @@
           </p:spPr>
         </p:pic>
       </p:grpSp>
+      <p:grpSp>
+        <p:nvGrpSpPr>
+          <p:cNvPr id="28" name="Agrupar 27">
+            <a:extLst>
+              <a:ext uri="{FF2B5EF4-FFF2-40B4-BE49-F238E27FC236}">
+                <a16:creationId xmlns:a16="http://schemas.microsoft.com/office/drawing/2014/main" id="{77C3BBB0-8D59-43D2-9BE1-766FAE9C0BA6}"/>
+              </a:ext>
+            </a:extLst>
+          </p:cNvPr>
+          <p:cNvGrpSpPr/>
+          <p:nvPr/>
+        </p:nvGrpSpPr>
+        <p:grpSpPr>
+          <a:xfrm>
+            <a:off x="361944" y="3417977"/>
+            <a:ext cx="2367643" cy="2791165"/>
+            <a:chOff x="293914" y="196964"/>
+            <a:chExt cx="2367643" cy="2791165"/>
+          </a:xfrm>
+        </p:grpSpPr>
+        <p:sp>
+          <p:nvSpPr>
+            <p:cNvPr id="29" name="Retângulo: Cantos Arredondados 3">
+              <a:extLst>
+                <a:ext uri="{FF2B5EF4-FFF2-40B4-BE49-F238E27FC236}">
+                  <a16:creationId xmlns:a16="http://schemas.microsoft.com/office/drawing/2014/main" id="{C1CDD6C3-10F8-4311-8617-85087E6F1154}"/>
+                </a:ext>
+              </a:extLst>
+            </p:cNvPr>
+            <p:cNvSpPr/>
+            <p:nvPr/>
+          </p:nvSpPr>
+          <p:spPr>
+            <a:xfrm>
+              <a:off x="293914" y="559254"/>
+              <a:ext cx="2367643" cy="2428875"/>
+            </a:xfrm>
+            <a:prstGeom prst="roundRect">
+              <a:avLst/>
+            </a:prstGeom>
+          </p:spPr>
+          <p:style>
+            <a:lnRef idx="1">
+              <a:schemeClr val="accent3"/>
+            </a:lnRef>
+            <a:fillRef idx="2">
+              <a:schemeClr val="accent3"/>
+            </a:fillRef>
+            <a:effectRef idx="1">
+              <a:schemeClr val="accent3"/>
+            </a:effectRef>
+            <a:fontRef idx="minor">
+              <a:schemeClr val="dk1"/>
+            </a:fontRef>
+          </p:style>
+          <p:txBody>
+            <a:bodyPr rtlCol="0" anchor="ctr"/>
+            <a:lstStyle/>
+            <a:p>
+              <a:pPr algn="ctr"/>
+              <a:r>
+                <a:rPr lang="pt-BR" dirty="0"/>
+                <a:t>Eu enquanto usuário </a:t>
+              </a:r>
+              <a:r>
+                <a:rPr lang="pt-BR" dirty="0" smtClean="0"/>
+                <a:t>quero acessos aos dados para prever possíveis avanços ou recuos </a:t>
+              </a:r>
+              <a:endParaRPr lang="pt-BR" dirty="0"/>
+            </a:p>
+          </p:txBody>
+        </p:sp>
+        <p:pic>
+          <p:nvPicPr>
+            <p:cNvPr id="30" name="Picture 4" descr="Usuário Pessoa Pessoas - Gráfico vetorial grátis no Pixabay">
+              <a:extLst>
+                <a:ext uri="{FF2B5EF4-FFF2-40B4-BE49-F238E27FC236}">
+                  <a16:creationId xmlns:a16="http://schemas.microsoft.com/office/drawing/2014/main" id="{69FE7E5F-7C9C-4677-9614-96E3546E9710}"/>
+                </a:ext>
+              </a:extLst>
+            </p:cNvPr>
+            <p:cNvPicPr>
+              <a:picLocks noChangeAspect="1" noChangeArrowheads="1"/>
+            </p:cNvPicPr>
+            <p:nvPr/>
+          </p:nvPicPr>
+          <p:blipFill>
+            <a:blip r:embed="rId2" cstate="hqprint">
+              <a:extLst>
+                <a:ext uri="{28A0092B-C50C-407E-A947-70E740481C1C}">
+                  <a14:useLocalDpi xmlns:a14="http://schemas.microsoft.com/office/drawing/2010/main" val="0"/>
+                </a:ext>
+              </a:extLst>
+            </a:blip>
+            <a:srcRect/>
+            <a:stretch>
+              <a:fillRect/>
+            </a:stretch>
+          </p:blipFill>
+          <p:spPr bwMode="auto">
+            <a:xfrm>
+              <a:off x="1091292" y="196964"/>
+              <a:ext cx="772885" cy="724579"/>
+            </a:xfrm>
+            <a:prstGeom prst="rect">
+              <a:avLst/>
+            </a:prstGeom>
+            <a:noFill/>
+            <a:extLst>
+              <a:ext uri="{909E8E84-426E-40DD-AFC4-6F175D3DCCD1}">
+                <a14:hiddenFill xmlns:a14="http://schemas.microsoft.com/office/drawing/2010/main">
+                  <a:solidFill>
+                    <a:srgbClr val="FFFFFF"/>
+                  </a:solidFill>
+                </a14:hiddenFill>
+              </a:ext>
+            </a:extLst>
+          </p:spPr>
+        </p:pic>
+      </p:grpSp>
     </p:spTree>
     <p:extLst>
       <p:ext uri="{BB962C8B-B14F-4D97-AF65-F5344CB8AC3E}">
         <p14:creationId xmlns:p14="http://schemas.microsoft.com/office/powerpoint/2010/main" val="2283346336"/>
+      </p:ext>
+    </p:extLst>
+  </p:cSld>
+  <p:clrMapOvr>
+    <a:masterClrMapping/>
+  </p:clrMapOvr>
+</p:sld>
+</file>
+
+<file path=ppt/slides/slide2.xml><?xml version="1.0" encoding="utf-8"?>
+<p:sld xmlns:a="http://schemas.openxmlformats.org/drawingml/2006/main" xmlns:r="http://schemas.openxmlformats.org/officeDocument/2006/relationships" xmlns:p="http://schemas.openxmlformats.org/presentationml/2006/main">
+  <p:cSld>
+    <p:spTree>
+      <p:nvGrpSpPr>
+        <p:cNvPr id="1" name=""/>
+        <p:cNvGrpSpPr/>
+        <p:nvPr/>
+      </p:nvGrpSpPr>
+      <p:grpSpPr>
+        <a:xfrm>
+          <a:off x="0" y="0"/>
+          <a:ext cx="0" cy="0"/>
+          <a:chOff x="0" y="0"/>
+          <a:chExt cx="0" cy="0"/>
+        </a:xfrm>
+      </p:grpSpPr>
+      <p:grpSp>
+        <p:nvGrpSpPr>
+          <p:cNvPr id="4" name="Agrupar 3">
+            <a:extLst>
+              <a:ext uri="{FF2B5EF4-FFF2-40B4-BE49-F238E27FC236}">
+                <a16:creationId xmlns:a16="http://schemas.microsoft.com/office/drawing/2014/main" id="{C4C93D86-376C-4D77-8848-52798F2264BD}"/>
+              </a:ext>
+            </a:extLst>
+          </p:cNvPr>
+          <p:cNvGrpSpPr/>
+          <p:nvPr/>
+        </p:nvGrpSpPr>
+        <p:grpSpPr>
+          <a:xfrm>
+            <a:off x="350517" y="295105"/>
+            <a:ext cx="2367643" cy="2791165"/>
+            <a:chOff x="293914" y="196964"/>
+            <a:chExt cx="2367643" cy="2791165"/>
+          </a:xfrm>
+        </p:grpSpPr>
+        <p:sp>
+          <p:nvSpPr>
+            <p:cNvPr id="5" name="Retângulo: Cantos Arredondados 13">
+              <a:extLst>
+                <a:ext uri="{FF2B5EF4-FFF2-40B4-BE49-F238E27FC236}">
+                  <a16:creationId xmlns:a16="http://schemas.microsoft.com/office/drawing/2014/main" id="{BA87640D-12B5-4A1A-88C7-C53269C56734}"/>
+                </a:ext>
+              </a:extLst>
+            </p:cNvPr>
+            <p:cNvSpPr/>
+            <p:nvPr/>
+          </p:nvSpPr>
+          <p:spPr>
+            <a:xfrm>
+              <a:off x="293914" y="559254"/>
+              <a:ext cx="2367643" cy="2428875"/>
+            </a:xfrm>
+            <a:prstGeom prst="roundRect">
+              <a:avLst/>
+            </a:prstGeom>
+          </p:spPr>
+          <p:style>
+            <a:lnRef idx="1">
+              <a:schemeClr val="accent3"/>
+            </a:lnRef>
+            <a:fillRef idx="2">
+              <a:schemeClr val="accent3"/>
+            </a:fillRef>
+            <a:effectRef idx="1">
+              <a:schemeClr val="accent3"/>
+            </a:effectRef>
+            <a:fontRef idx="minor">
+              <a:schemeClr val="dk1"/>
+            </a:fontRef>
+          </p:style>
+          <p:txBody>
+            <a:bodyPr rtlCol="0" anchor="ctr"/>
+            <a:lstStyle/>
+            <a:p>
+              <a:pPr algn="ctr"/>
+              <a:r>
+                <a:rPr lang="pt-BR" dirty="0"/>
+                <a:t>Eu enquanto analistas quero </a:t>
+              </a:r>
+              <a:r>
+                <a:rPr lang="pt-BR" dirty="0" smtClean="0"/>
+                <a:t>um sistema</a:t>
+              </a:r>
+              <a:r>
+                <a:rPr lang="pt-BR" dirty="0" smtClean="0"/>
+                <a:t> </a:t>
+              </a:r>
+              <a:r>
+                <a:rPr lang="pt-BR" dirty="0"/>
+                <a:t>para captação de </a:t>
+              </a:r>
+              <a:r>
+                <a:rPr lang="pt-BR" dirty="0" smtClean="0"/>
+                <a:t>dados</a:t>
+              </a:r>
+            </a:p>
+            <a:p>
+              <a:pPr algn="ctr"/>
+              <a:r>
+                <a:rPr lang="pt-BR" dirty="0" smtClean="0"/>
+                <a:t>máquina </a:t>
+              </a:r>
+              <a:endParaRPr lang="pt-BR" dirty="0"/>
+            </a:p>
+          </p:txBody>
+        </p:sp>
+        <p:pic>
+          <p:nvPicPr>
+            <p:cNvPr id="6" name="Picture 4" descr="Usuário Pessoa Pessoas - Gráfico vetorial grátis no Pixabay">
+              <a:extLst>
+                <a:ext uri="{FF2B5EF4-FFF2-40B4-BE49-F238E27FC236}">
+                  <a16:creationId xmlns:a16="http://schemas.microsoft.com/office/drawing/2014/main" id="{7F7A0B22-8101-4250-9466-6D307C3D75C2}"/>
+                </a:ext>
+              </a:extLst>
+            </p:cNvPr>
+            <p:cNvPicPr>
+              <a:picLocks noChangeAspect="1" noChangeArrowheads="1"/>
+            </p:cNvPicPr>
+            <p:nvPr/>
+          </p:nvPicPr>
+          <p:blipFill>
+            <a:blip r:embed="rId2" cstate="hqprint">
+              <a:extLst>
+                <a:ext uri="{28A0092B-C50C-407E-A947-70E740481C1C}">
+                  <a14:useLocalDpi xmlns:a14="http://schemas.microsoft.com/office/drawing/2010/main" val="0"/>
+                </a:ext>
+              </a:extLst>
+            </a:blip>
+            <a:srcRect/>
+            <a:stretch>
+              <a:fillRect/>
+            </a:stretch>
+          </p:blipFill>
+          <p:spPr bwMode="auto">
+            <a:xfrm>
+              <a:off x="1091292" y="196964"/>
+              <a:ext cx="772885" cy="724579"/>
+            </a:xfrm>
+            <a:prstGeom prst="rect">
+              <a:avLst/>
+            </a:prstGeom>
+            <a:noFill/>
+            <a:extLst>
+              <a:ext uri="{909E8E84-426E-40DD-AFC4-6F175D3DCCD1}">
+                <a14:hiddenFill xmlns:a14="http://schemas.microsoft.com/office/drawing/2010/main">
+                  <a:solidFill>
+                    <a:srgbClr val="FFFFFF"/>
+                  </a:solidFill>
+                </a14:hiddenFill>
+              </a:ext>
+            </a:extLst>
+          </p:spPr>
+        </p:pic>
+      </p:grpSp>
+      <p:grpSp>
+        <p:nvGrpSpPr>
+          <p:cNvPr id="7" name="Agrupar 6">
+            <a:extLst>
+              <a:ext uri="{FF2B5EF4-FFF2-40B4-BE49-F238E27FC236}">
+                <a16:creationId xmlns:a16="http://schemas.microsoft.com/office/drawing/2014/main" id="{C4C93D86-376C-4D77-8848-52798F2264BD}"/>
+              </a:ext>
+            </a:extLst>
+          </p:cNvPr>
+          <p:cNvGrpSpPr/>
+          <p:nvPr/>
+        </p:nvGrpSpPr>
+        <p:grpSpPr>
+          <a:xfrm>
+            <a:off x="3515538" y="295105"/>
+            <a:ext cx="2367643" cy="2791165"/>
+            <a:chOff x="293914" y="196964"/>
+            <a:chExt cx="2367643" cy="2791165"/>
+          </a:xfrm>
+        </p:grpSpPr>
+        <p:sp>
+          <p:nvSpPr>
+            <p:cNvPr id="8" name="Retângulo: Cantos Arredondados 13">
+              <a:extLst>
+                <a:ext uri="{FF2B5EF4-FFF2-40B4-BE49-F238E27FC236}">
+                  <a16:creationId xmlns:a16="http://schemas.microsoft.com/office/drawing/2014/main" id="{BA87640D-12B5-4A1A-88C7-C53269C56734}"/>
+                </a:ext>
+              </a:extLst>
+            </p:cNvPr>
+            <p:cNvSpPr/>
+            <p:nvPr/>
+          </p:nvSpPr>
+          <p:spPr>
+            <a:xfrm>
+              <a:off x="293914" y="559254"/>
+              <a:ext cx="2367643" cy="2428875"/>
+            </a:xfrm>
+            <a:prstGeom prst="roundRect">
+              <a:avLst/>
+            </a:prstGeom>
+          </p:spPr>
+          <p:style>
+            <a:lnRef idx="1">
+              <a:schemeClr val="accent3"/>
+            </a:lnRef>
+            <a:fillRef idx="2">
+              <a:schemeClr val="accent3"/>
+            </a:fillRef>
+            <a:effectRef idx="1">
+              <a:schemeClr val="accent3"/>
+            </a:effectRef>
+            <a:fontRef idx="minor">
+              <a:schemeClr val="dk1"/>
+            </a:fontRef>
+          </p:style>
+          <p:txBody>
+            <a:bodyPr rtlCol="0" anchor="ctr"/>
+            <a:lstStyle/>
+            <a:p>
+              <a:pPr algn="ctr"/>
+              <a:r>
+                <a:rPr lang="pt-BR" dirty="0"/>
+                <a:t>Eu enquanto </a:t>
+              </a:r>
+              <a:r>
+                <a:rPr lang="pt-BR" dirty="0" smtClean="0"/>
+                <a:t>gerente </a:t>
+              </a:r>
+              <a:r>
+                <a:rPr lang="pt-BR" dirty="0"/>
+                <a:t>quero </a:t>
+              </a:r>
+              <a:r>
+                <a:rPr lang="pt-BR" dirty="0" smtClean="0"/>
+                <a:t>configurações gráficas </a:t>
+              </a:r>
+              <a:r>
+                <a:rPr lang="pt-BR" dirty="0" smtClean="0"/>
+                <a:t>para</a:t>
+              </a:r>
+            </a:p>
+            <a:p>
+              <a:pPr algn="ctr"/>
+              <a:r>
+                <a:rPr lang="pt-BR" dirty="0" smtClean="0"/>
+                <a:t>ter melhor ciência e administração </a:t>
+              </a:r>
+              <a:r>
+                <a:rPr lang="pt-BR" dirty="0" smtClean="0"/>
+                <a:t> </a:t>
+              </a:r>
+              <a:endParaRPr lang="pt-BR" dirty="0"/>
+            </a:p>
+          </p:txBody>
+        </p:sp>
+        <p:pic>
+          <p:nvPicPr>
+            <p:cNvPr id="9" name="Picture 4" descr="Usuário Pessoa Pessoas - Gráfico vetorial grátis no Pixabay">
+              <a:extLst>
+                <a:ext uri="{FF2B5EF4-FFF2-40B4-BE49-F238E27FC236}">
+                  <a16:creationId xmlns:a16="http://schemas.microsoft.com/office/drawing/2014/main" id="{7F7A0B22-8101-4250-9466-6D307C3D75C2}"/>
+                </a:ext>
+              </a:extLst>
+            </p:cNvPr>
+            <p:cNvPicPr>
+              <a:picLocks noChangeAspect="1" noChangeArrowheads="1"/>
+            </p:cNvPicPr>
+            <p:nvPr/>
+          </p:nvPicPr>
+          <p:blipFill>
+            <a:blip r:embed="rId2" cstate="hqprint">
+              <a:extLst>
+                <a:ext uri="{28A0092B-C50C-407E-A947-70E740481C1C}">
+                  <a14:useLocalDpi xmlns:a14="http://schemas.microsoft.com/office/drawing/2010/main" val="0"/>
+                </a:ext>
+              </a:extLst>
+            </a:blip>
+            <a:srcRect/>
+            <a:stretch>
+              <a:fillRect/>
+            </a:stretch>
+          </p:blipFill>
+          <p:spPr bwMode="auto">
+            <a:xfrm>
+              <a:off x="1091292" y="196964"/>
+              <a:ext cx="772885" cy="724579"/>
+            </a:xfrm>
+            <a:prstGeom prst="rect">
+              <a:avLst/>
+            </a:prstGeom>
+            <a:noFill/>
+            <a:extLst>
+              <a:ext uri="{909E8E84-426E-40DD-AFC4-6F175D3DCCD1}">
+                <a14:hiddenFill xmlns:a14="http://schemas.microsoft.com/office/drawing/2010/main">
+                  <a:solidFill>
+                    <a:srgbClr val="FFFFFF"/>
+                  </a:solidFill>
+                </a14:hiddenFill>
+              </a:ext>
+            </a:extLst>
+          </p:spPr>
+        </p:pic>
+      </p:grpSp>
+      <p:grpSp>
+        <p:nvGrpSpPr>
+          <p:cNvPr id="10" name="Agrupar 9">
+            <a:extLst>
+              <a:ext uri="{FF2B5EF4-FFF2-40B4-BE49-F238E27FC236}">
+                <a16:creationId xmlns:a16="http://schemas.microsoft.com/office/drawing/2014/main" id="{C4C93D86-376C-4D77-8848-52798F2264BD}"/>
+              </a:ext>
+            </a:extLst>
+          </p:cNvPr>
+          <p:cNvGrpSpPr/>
+          <p:nvPr/>
+        </p:nvGrpSpPr>
+        <p:grpSpPr>
+          <a:xfrm>
+            <a:off x="6680557" y="295105"/>
+            <a:ext cx="2367643" cy="2791165"/>
+            <a:chOff x="293914" y="196964"/>
+            <a:chExt cx="2367643" cy="2791165"/>
+          </a:xfrm>
+        </p:grpSpPr>
+        <p:sp>
+          <p:nvSpPr>
+            <p:cNvPr id="11" name="Retângulo: Cantos Arredondados 13">
+              <a:extLst>
+                <a:ext uri="{FF2B5EF4-FFF2-40B4-BE49-F238E27FC236}">
+                  <a16:creationId xmlns:a16="http://schemas.microsoft.com/office/drawing/2014/main" id="{BA87640D-12B5-4A1A-88C7-C53269C56734}"/>
+                </a:ext>
+              </a:extLst>
+            </p:cNvPr>
+            <p:cNvSpPr/>
+            <p:nvPr/>
+          </p:nvSpPr>
+          <p:spPr>
+            <a:xfrm>
+              <a:off x="293914" y="559254"/>
+              <a:ext cx="2367643" cy="2428875"/>
+            </a:xfrm>
+            <a:prstGeom prst="roundRect">
+              <a:avLst/>
+            </a:prstGeom>
+          </p:spPr>
+          <p:style>
+            <a:lnRef idx="1">
+              <a:schemeClr val="accent3"/>
+            </a:lnRef>
+            <a:fillRef idx="2">
+              <a:schemeClr val="accent3"/>
+            </a:fillRef>
+            <a:effectRef idx="1">
+              <a:schemeClr val="accent3"/>
+            </a:effectRef>
+            <a:fontRef idx="minor">
+              <a:schemeClr val="dk1"/>
+            </a:fontRef>
+          </p:style>
+          <p:txBody>
+            <a:bodyPr rtlCol="0" anchor="ctr"/>
+            <a:lstStyle/>
+            <a:p>
+              <a:pPr algn="ctr"/>
+              <a:r>
+                <a:rPr lang="pt-BR" dirty="0"/>
+                <a:t>Eu enquanto analistas quero </a:t>
+              </a:r>
+              <a:r>
+                <a:rPr lang="pt-BR" dirty="0" smtClean="0"/>
+                <a:t>uma plataforma responsiva</a:t>
+              </a:r>
+              <a:r>
+                <a:rPr lang="pt-BR" dirty="0" smtClean="0"/>
+                <a:t> </a:t>
+              </a:r>
+              <a:r>
+                <a:rPr lang="pt-BR" dirty="0"/>
+                <a:t>para </a:t>
+              </a:r>
+              <a:r>
+                <a:rPr lang="pt-BR" dirty="0" smtClean="0"/>
+                <a:t>utilizar em vários dispositivos </a:t>
+              </a:r>
+              <a:endParaRPr lang="pt-BR" dirty="0"/>
+            </a:p>
+          </p:txBody>
+        </p:sp>
+        <p:pic>
+          <p:nvPicPr>
+            <p:cNvPr id="12" name="Picture 4" descr="Usuário Pessoa Pessoas - Gráfico vetorial grátis no Pixabay">
+              <a:extLst>
+                <a:ext uri="{FF2B5EF4-FFF2-40B4-BE49-F238E27FC236}">
+                  <a16:creationId xmlns:a16="http://schemas.microsoft.com/office/drawing/2014/main" id="{7F7A0B22-8101-4250-9466-6D307C3D75C2}"/>
+                </a:ext>
+              </a:extLst>
+            </p:cNvPr>
+            <p:cNvPicPr>
+              <a:picLocks noChangeAspect="1" noChangeArrowheads="1"/>
+            </p:cNvPicPr>
+            <p:nvPr/>
+          </p:nvPicPr>
+          <p:blipFill>
+            <a:blip r:embed="rId2" cstate="hqprint">
+              <a:extLst>
+                <a:ext uri="{28A0092B-C50C-407E-A947-70E740481C1C}">
+                  <a14:useLocalDpi xmlns:a14="http://schemas.microsoft.com/office/drawing/2010/main" val="0"/>
+                </a:ext>
+              </a:extLst>
+            </a:blip>
+            <a:srcRect/>
+            <a:stretch>
+              <a:fillRect/>
+            </a:stretch>
+          </p:blipFill>
+          <p:spPr bwMode="auto">
+            <a:xfrm>
+              <a:off x="1091292" y="196964"/>
+              <a:ext cx="772885" cy="724579"/>
+            </a:xfrm>
+            <a:prstGeom prst="rect">
+              <a:avLst/>
+            </a:prstGeom>
+            <a:noFill/>
+            <a:extLst>
+              <a:ext uri="{909E8E84-426E-40DD-AFC4-6F175D3DCCD1}">
+                <a14:hiddenFill xmlns:a14="http://schemas.microsoft.com/office/drawing/2010/main">
+                  <a:solidFill>
+                    <a:srgbClr val="FFFFFF"/>
+                  </a:solidFill>
+                </a14:hiddenFill>
+              </a:ext>
+            </a:extLst>
+          </p:spPr>
+        </p:pic>
+      </p:grpSp>
+      <p:grpSp>
+        <p:nvGrpSpPr>
+          <p:cNvPr id="13" name="Agrupar 12">
+            <a:extLst>
+              <a:ext uri="{FF2B5EF4-FFF2-40B4-BE49-F238E27FC236}">
+                <a16:creationId xmlns:a16="http://schemas.microsoft.com/office/drawing/2014/main" id="{C4C93D86-376C-4D77-8848-52798F2264BD}"/>
+              </a:ext>
+            </a:extLst>
+          </p:cNvPr>
+          <p:cNvGrpSpPr/>
+          <p:nvPr/>
+        </p:nvGrpSpPr>
+        <p:grpSpPr>
+          <a:xfrm>
+            <a:off x="9667597" y="295105"/>
+            <a:ext cx="2367643" cy="2791165"/>
+            <a:chOff x="293914" y="196964"/>
+            <a:chExt cx="2367643" cy="2791165"/>
+          </a:xfrm>
+        </p:grpSpPr>
+        <p:sp>
+          <p:nvSpPr>
+            <p:cNvPr id="14" name="Retângulo: Cantos Arredondados 13">
+              <a:extLst>
+                <a:ext uri="{FF2B5EF4-FFF2-40B4-BE49-F238E27FC236}">
+                  <a16:creationId xmlns:a16="http://schemas.microsoft.com/office/drawing/2014/main" id="{BA87640D-12B5-4A1A-88C7-C53269C56734}"/>
+                </a:ext>
+              </a:extLst>
+            </p:cNvPr>
+            <p:cNvSpPr/>
+            <p:nvPr/>
+          </p:nvSpPr>
+          <p:spPr>
+            <a:xfrm>
+              <a:off x="293914" y="559254"/>
+              <a:ext cx="2367643" cy="2428875"/>
+            </a:xfrm>
+            <a:prstGeom prst="roundRect">
+              <a:avLst/>
+            </a:prstGeom>
+          </p:spPr>
+          <p:style>
+            <a:lnRef idx="1">
+              <a:schemeClr val="accent3"/>
+            </a:lnRef>
+            <a:fillRef idx="2">
+              <a:schemeClr val="accent3"/>
+            </a:fillRef>
+            <a:effectRef idx="1">
+              <a:schemeClr val="accent3"/>
+            </a:effectRef>
+            <a:fontRef idx="minor">
+              <a:schemeClr val="dk1"/>
+            </a:fontRef>
+          </p:style>
+          <p:txBody>
+            <a:bodyPr rtlCol="0" anchor="ctr"/>
+            <a:lstStyle/>
+            <a:p>
+              <a:pPr algn="ctr"/>
+              <a:r>
+                <a:rPr lang="pt-BR" dirty="0"/>
+                <a:t>Eu enquanto </a:t>
+              </a:r>
+              <a:r>
+                <a:rPr lang="pt-BR" dirty="0" smtClean="0"/>
+                <a:t>analista quero saber o status dos sensores </a:t>
+              </a:r>
+              <a:r>
+                <a:rPr lang="pt-BR" dirty="0"/>
+                <a:t>para </a:t>
+              </a:r>
+              <a:r>
+                <a:rPr lang="pt-BR" dirty="0" smtClean="0"/>
+                <a:t>facilitar a manutenção</a:t>
+              </a:r>
+              <a:endParaRPr lang="pt-BR" dirty="0"/>
+            </a:p>
+          </p:txBody>
+        </p:sp>
+        <p:pic>
+          <p:nvPicPr>
+            <p:cNvPr id="15" name="Picture 4" descr="Usuário Pessoa Pessoas - Gráfico vetorial grátis no Pixabay">
+              <a:extLst>
+                <a:ext uri="{FF2B5EF4-FFF2-40B4-BE49-F238E27FC236}">
+                  <a16:creationId xmlns:a16="http://schemas.microsoft.com/office/drawing/2014/main" id="{7F7A0B22-8101-4250-9466-6D307C3D75C2}"/>
+                </a:ext>
+              </a:extLst>
+            </p:cNvPr>
+            <p:cNvPicPr>
+              <a:picLocks noChangeAspect="1" noChangeArrowheads="1"/>
+            </p:cNvPicPr>
+            <p:nvPr/>
+          </p:nvPicPr>
+          <p:blipFill>
+            <a:blip r:embed="rId2" cstate="hqprint">
+              <a:extLst>
+                <a:ext uri="{28A0092B-C50C-407E-A947-70E740481C1C}">
+                  <a14:useLocalDpi xmlns:a14="http://schemas.microsoft.com/office/drawing/2010/main" val="0"/>
+                </a:ext>
+              </a:extLst>
+            </a:blip>
+            <a:srcRect/>
+            <a:stretch>
+              <a:fillRect/>
+            </a:stretch>
+          </p:blipFill>
+          <p:spPr bwMode="auto">
+            <a:xfrm>
+              <a:off x="1091292" y="196964"/>
+              <a:ext cx="772885" cy="724579"/>
+            </a:xfrm>
+            <a:prstGeom prst="rect">
+              <a:avLst/>
+            </a:prstGeom>
+            <a:noFill/>
+            <a:extLst>
+              <a:ext uri="{909E8E84-426E-40DD-AFC4-6F175D3DCCD1}">
+                <a14:hiddenFill xmlns:a14="http://schemas.microsoft.com/office/drawing/2010/main">
+                  <a:solidFill>
+                    <a:srgbClr val="FFFFFF"/>
+                  </a:solidFill>
+                </a14:hiddenFill>
+              </a:ext>
+            </a:extLst>
+          </p:spPr>
+        </p:pic>
+      </p:grpSp>
+      <p:grpSp>
+        <p:nvGrpSpPr>
+          <p:cNvPr id="16" name="Agrupar 15">
+            <a:extLst>
+              <a:ext uri="{FF2B5EF4-FFF2-40B4-BE49-F238E27FC236}">
+                <a16:creationId xmlns:a16="http://schemas.microsoft.com/office/drawing/2014/main" id="{C4C93D86-376C-4D77-8848-52798F2264BD}"/>
+              </a:ext>
+            </a:extLst>
+          </p:cNvPr>
+          <p:cNvGrpSpPr/>
+          <p:nvPr/>
+        </p:nvGrpSpPr>
+        <p:grpSpPr>
+          <a:xfrm>
+            <a:off x="321662" y="3448560"/>
+            <a:ext cx="2367643" cy="2791165"/>
+            <a:chOff x="293914" y="196964"/>
+            <a:chExt cx="2367643" cy="2791165"/>
+          </a:xfrm>
+        </p:grpSpPr>
+        <p:sp>
+          <p:nvSpPr>
+            <p:cNvPr id="17" name="Retângulo: Cantos Arredondados 13">
+              <a:extLst>
+                <a:ext uri="{FF2B5EF4-FFF2-40B4-BE49-F238E27FC236}">
+                  <a16:creationId xmlns:a16="http://schemas.microsoft.com/office/drawing/2014/main" id="{BA87640D-12B5-4A1A-88C7-C53269C56734}"/>
+                </a:ext>
+              </a:extLst>
+            </p:cNvPr>
+            <p:cNvSpPr/>
+            <p:nvPr/>
+          </p:nvSpPr>
+          <p:spPr>
+            <a:xfrm>
+              <a:off x="293914" y="559254"/>
+              <a:ext cx="2367643" cy="2428875"/>
+            </a:xfrm>
+            <a:prstGeom prst="roundRect">
+              <a:avLst/>
+            </a:prstGeom>
+          </p:spPr>
+          <p:style>
+            <a:lnRef idx="1">
+              <a:schemeClr val="accent3"/>
+            </a:lnRef>
+            <a:fillRef idx="2">
+              <a:schemeClr val="accent3"/>
+            </a:fillRef>
+            <a:effectRef idx="1">
+              <a:schemeClr val="accent3"/>
+            </a:effectRef>
+            <a:fontRef idx="minor">
+              <a:schemeClr val="dk1"/>
+            </a:fontRef>
+          </p:style>
+          <p:txBody>
+            <a:bodyPr rtlCol="0" anchor="ctr"/>
+            <a:lstStyle/>
+            <a:p>
+              <a:pPr algn="ctr"/>
+              <a:r>
+                <a:rPr lang="pt-BR" dirty="0"/>
+                <a:t>Eu enquanto </a:t>
+              </a:r>
+              <a:r>
+                <a:rPr lang="pt-BR" dirty="0" smtClean="0"/>
+                <a:t>analista quero saber o status da memória para </a:t>
+              </a:r>
+              <a:r>
+                <a:rPr lang="pt-BR" dirty="0" smtClean="0"/>
+                <a:t>não ter picos ou perdas de dados</a:t>
+              </a:r>
+              <a:endParaRPr lang="pt-BR" dirty="0"/>
+            </a:p>
+          </p:txBody>
+        </p:sp>
+        <p:pic>
+          <p:nvPicPr>
+            <p:cNvPr id="18" name="Picture 4" descr="Usuário Pessoa Pessoas - Gráfico vetorial grátis no Pixabay">
+              <a:extLst>
+                <a:ext uri="{FF2B5EF4-FFF2-40B4-BE49-F238E27FC236}">
+                  <a16:creationId xmlns:a16="http://schemas.microsoft.com/office/drawing/2014/main" id="{7F7A0B22-8101-4250-9466-6D307C3D75C2}"/>
+                </a:ext>
+              </a:extLst>
+            </p:cNvPr>
+            <p:cNvPicPr>
+              <a:picLocks noChangeAspect="1" noChangeArrowheads="1"/>
+            </p:cNvPicPr>
+            <p:nvPr/>
+          </p:nvPicPr>
+          <p:blipFill>
+            <a:blip r:embed="rId2" cstate="hqprint">
+              <a:extLst>
+                <a:ext uri="{28A0092B-C50C-407E-A947-70E740481C1C}">
+                  <a14:useLocalDpi xmlns:a14="http://schemas.microsoft.com/office/drawing/2010/main" val="0"/>
+                </a:ext>
+              </a:extLst>
+            </a:blip>
+            <a:srcRect/>
+            <a:stretch>
+              <a:fillRect/>
+            </a:stretch>
+          </p:blipFill>
+          <p:spPr bwMode="auto">
+            <a:xfrm>
+              <a:off x="1091292" y="196964"/>
+              <a:ext cx="772885" cy="724579"/>
+            </a:xfrm>
+            <a:prstGeom prst="rect">
+              <a:avLst/>
+            </a:prstGeom>
+            <a:noFill/>
+            <a:extLst>
+              <a:ext uri="{909E8E84-426E-40DD-AFC4-6F175D3DCCD1}">
+                <a14:hiddenFill xmlns:a14="http://schemas.microsoft.com/office/drawing/2010/main">
+                  <a:solidFill>
+                    <a:srgbClr val="FFFFFF"/>
+                  </a:solidFill>
+                </a14:hiddenFill>
+              </a:ext>
+            </a:extLst>
+          </p:spPr>
+        </p:pic>
+      </p:grpSp>
+      <p:grpSp>
+        <p:nvGrpSpPr>
+          <p:cNvPr id="19" name="Agrupar 18">
+            <a:extLst>
+              <a:ext uri="{FF2B5EF4-FFF2-40B4-BE49-F238E27FC236}">
+                <a16:creationId xmlns:a16="http://schemas.microsoft.com/office/drawing/2014/main" id="{C4C93D86-376C-4D77-8848-52798F2264BD}"/>
+              </a:ext>
+            </a:extLst>
+          </p:cNvPr>
+          <p:cNvGrpSpPr/>
+          <p:nvPr/>
+        </p:nvGrpSpPr>
+        <p:grpSpPr>
+          <a:xfrm>
+            <a:off x="3515538" y="3448560"/>
+            <a:ext cx="2367643" cy="2791165"/>
+            <a:chOff x="293914" y="196964"/>
+            <a:chExt cx="2367643" cy="2791165"/>
+          </a:xfrm>
+        </p:grpSpPr>
+        <p:sp>
+          <p:nvSpPr>
+            <p:cNvPr id="20" name="Retângulo: Cantos Arredondados 13">
+              <a:extLst>
+                <a:ext uri="{FF2B5EF4-FFF2-40B4-BE49-F238E27FC236}">
+                  <a16:creationId xmlns:a16="http://schemas.microsoft.com/office/drawing/2014/main" id="{BA87640D-12B5-4A1A-88C7-C53269C56734}"/>
+                </a:ext>
+              </a:extLst>
+            </p:cNvPr>
+            <p:cNvSpPr/>
+            <p:nvPr/>
+          </p:nvSpPr>
+          <p:spPr>
+            <a:xfrm>
+              <a:off x="293914" y="559254"/>
+              <a:ext cx="2367643" cy="2428875"/>
+            </a:xfrm>
+            <a:prstGeom prst="roundRect">
+              <a:avLst/>
+            </a:prstGeom>
+          </p:spPr>
+          <p:style>
+            <a:lnRef idx="1">
+              <a:schemeClr val="accent3"/>
+            </a:lnRef>
+            <a:fillRef idx="2">
+              <a:schemeClr val="accent3"/>
+            </a:fillRef>
+            <a:effectRef idx="1">
+              <a:schemeClr val="accent3"/>
+            </a:effectRef>
+            <a:fontRef idx="minor">
+              <a:schemeClr val="dk1"/>
+            </a:fontRef>
+          </p:style>
+          <p:txBody>
+            <a:bodyPr rtlCol="0" anchor="ctr"/>
+            <a:lstStyle/>
+            <a:p>
+              <a:pPr algn="ctr"/>
+              <a:r>
+                <a:rPr lang="pt-BR" dirty="0"/>
+                <a:t>Eu enquanto </a:t>
+              </a:r>
+              <a:r>
+                <a:rPr lang="pt-BR" dirty="0" smtClean="0"/>
+                <a:t>analista quero saber o status da memória virtual para não haver sobrecarga</a:t>
+              </a:r>
+              <a:endParaRPr lang="pt-BR" dirty="0"/>
+            </a:p>
+          </p:txBody>
+        </p:sp>
+        <p:pic>
+          <p:nvPicPr>
+            <p:cNvPr id="21" name="Picture 4" descr="Usuário Pessoa Pessoas - Gráfico vetorial grátis no Pixabay">
+              <a:extLst>
+                <a:ext uri="{FF2B5EF4-FFF2-40B4-BE49-F238E27FC236}">
+                  <a16:creationId xmlns:a16="http://schemas.microsoft.com/office/drawing/2014/main" id="{7F7A0B22-8101-4250-9466-6D307C3D75C2}"/>
+                </a:ext>
+              </a:extLst>
+            </p:cNvPr>
+            <p:cNvPicPr>
+              <a:picLocks noChangeAspect="1" noChangeArrowheads="1"/>
+            </p:cNvPicPr>
+            <p:nvPr/>
+          </p:nvPicPr>
+          <p:blipFill>
+            <a:blip r:embed="rId2" cstate="hqprint">
+              <a:extLst>
+                <a:ext uri="{28A0092B-C50C-407E-A947-70E740481C1C}">
+                  <a14:useLocalDpi xmlns:a14="http://schemas.microsoft.com/office/drawing/2010/main" val="0"/>
+                </a:ext>
+              </a:extLst>
+            </a:blip>
+            <a:srcRect/>
+            <a:stretch>
+              <a:fillRect/>
+            </a:stretch>
+          </p:blipFill>
+          <p:spPr bwMode="auto">
+            <a:xfrm>
+              <a:off x="1091292" y="196964"/>
+              <a:ext cx="772885" cy="724579"/>
+            </a:xfrm>
+            <a:prstGeom prst="rect">
+              <a:avLst/>
+            </a:prstGeom>
+            <a:noFill/>
+            <a:extLst>
+              <a:ext uri="{909E8E84-426E-40DD-AFC4-6F175D3DCCD1}">
+                <a14:hiddenFill xmlns:a14="http://schemas.microsoft.com/office/drawing/2010/main">
+                  <a:solidFill>
+                    <a:srgbClr val="FFFFFF"/>
+                  </a:solidFill>
+                </a14:hiddenFill>
+              </a:ext>
+            </a:extLst>
+          </p:spPr>
+        </p:pic>
+      </p:grpSp>
+      <p:grpSp>
+        <p:nvGrpSpPr>
+          <p:cNvPr id="22" name="Agrupar 21">
+            <a:extLst>
+              <a:ext uri="{FF2B5EF4-FFF2-40B4-BE49-F238E27FC236}">
+                <a16:creationId xmlns:a16="http://schemas.microsoft.com/office/drawing/2014/main" id="{C4C93D86-376C-4D77-8848-52798F2264BD}"/>
+              </a:ext>
+            </a:extLst>
+          </p:cNvPr>
+          <p:cNvGrpSpPr/>
+          <p:nvPr/>
+        </p:nvGrpSpPr>
+        <p:grpSpPr>
+          <a:xfrm>
+            <a:off x="6680557" y="3448560"/>
+            <a:ext cx="2367643" cy="2791165"/>
+            <a:chOff x="293914" y="196964"/>
+            <a:chExt cx="2367643" cy="2791165"/>
+          </a:xfrm>
+        </p:grpSpPr>
+        <p:sp>
+          <p:nvSpPr>
+            <p:cNvPr id="23" name="Retângulo: Cantos Arredondados 13">
+              <a:extLst>
+                <a:ext uri="{FF2B5EF4-FFF2-40B4-BE49-F238E27FC236}">
+                  <a16:creationId xmlns:a16="http://schemas.microsoft.com/office/drawing/2014/main" id="{BA87640D-12B5-4A1A-88C7-C53269C56734}"/>
+                </a:ext>
+              </a:extLst>
+            </p:cNvPr>
+            <p:cNvSpPr/>
+            <p:nvPr/>
+          </p:nvSpPr>
+          <p:spPr>
+            <a:xfrm>
+              <a:off x="293914" y="559254"/>
+              <a:ext cx="2367643" cy="2428875"/>
+            </a:xfrm>
+            <a:prstGeom prst="roundRect">
+              <a:avLst/>
+            </a:prstGeom>
+          </p:spPr>
+          <p:style>
+            <a:lnRef idx="1">
+              <a:schemeClr val="accent3"/>
+            </a:lnRef>
+            <a:fillRef idx="2">
+              <a:schemeClr val="accent3"/>
+            </a:fillRef>
+            <a:effectRef idx="1">
+              <a:schemeClr val="accent3"/>
+            </a:effectRef>
+            <a:fontRef idx="minor">
+              <a:schemeClr val="dk1"/>
+            </a:fontRef>
+          </p:style>
+          <p:txBody>
+            <a:bodyPr rtlCol="0" anchor="ctr"/>
+            <a:lstStyle/>
+            <a:p>
+              <a:pPr algn="ctr"/>
+              <a:r>
+                <a:rPr lang="pt-BR" dirty="0"/>
+                <a:t>Eu enquanto </a:t>
+              </a:r>
+              <a:r>
+                <a:rPr lang="pt-BR" dirty="0" smtClean="0"/>
+                <a:t>analista quero saber a situação do uso da nuvem para não haver gastos desnecessários</a:t>
+              </a:r>
+              <a:endParaRPr lang="pt-BR" dirty="0"/>
+            </a:p>
+          </p:txBody>
+        </p:sp>
+        <p:pic>
+          <p:nvPicPr>
+            <p:cNvPr id="24" name="Picture 4" descr="Usuário Pessoa Pessoas - Gráfico vetorial grátis no Pixabay">
+              <a:extLst>
+                <a:ext uri="{FF2B5EF4-FFF2-40B4-BE49-F238E27FC236}">
+                  <a16:creationId xmlns:a16="http://schemas.microsoft.com/office/drawing/2014/main" id="{7F7A0B22-8101-4250-9466-6D307C3D75C2}"/>
+                </a:ext>
+              </a:extLst>
+            </p:cNvPr>
+            <p:cNvPicPr>
+              <a:picLocks noChangeAspect="1" noChangeArrowheads="1"/>
+            </p:cNvPicPr>
+            <p:nvPr/>
+          </p:nvPicPr>
+          <p:blipFill>
+            <a:blip r:embed="rId2" cstate="hqprint">
+              <a:extLst>
+                <a:ext uri="{28A0092B-C50C-407E-A947-70E740481C1C}">
+                  <a14:useLocalDpi xmlns:a14="http://schemas.microsoft.com/office/drawing/2010/main" val="0"/>
+                </a:ext>
+              </a:extLst>
+            </a:blip>
+            <a:srcRect/>
+            <a:stretch>
+              <a:fillRect/>
+            </a:stretch>
+          </p:blipFill>
+          <p:spPr bwMode="auto">
+            <a:xfrm>
+              <a:off x="1091292" y="196964"/>
+              <a:ext cx="772885" cy="724579"/>
+            </a:xfrm>
+            <a:prstGeom prst="rect">
+              <a:avLst/>
+            </a:prstGeom>
+            <a:noFill/>
+            <a:extLst>
+              <a:ext uri="{909E8E84-426E-40DD-AFC4-6F175D3DCCD1}">
+                <a14:hiddenFill xmlns:a14="http://schemas.microsoft.com/office/drawing/2010/main">
+                  <a:solidFill>
+                    <a:srgbClr val="FFFFFF"/>
+                  </a:solidFill>
+                </a14:hiddenFill>
+              </a:ext>
+            </a:extLst>
+          </p:spPr>
+        </p:pic>
+      </p:grpSp>
+      <p:grpSp>
+        <p:nvGrpSpPr>
+          <p:cNvPr id="25" name="Agrupar 24">
+            <a:extLst>
+              <a:ext uri="{FF2B5EF4-FFF2-40B4-BE49-F238E27FC236}">
+                <a16:creationId xmlns:a16="http://schemas.microsoft.com/office/drawing/2014/main" id="{C4C93D86-376C-4D77-8848-52798F2264BD}"/>
+              </a:ext>
+            </a:extLst>
+          </p:cNvPr>
+          <p:cNvGrpSpPr/>
+          <p:nvPr/>
+        </p:nvGrpSpPr>
+        <p:grpSpPr>
+          <a:xfrm>
+            <a:off x="9667597" y="3448560"/>
+            <a:ext cx="2367643" cy="2791165"/>
+            <a:chOff x="293914" y="196964"/>
+            <a:chExt cx="2367643" cy="2791165"/>
+          </a:xfrm>
+        </p:grpSpPr>
+        <p:sp>
+          <p:nvSpPr>
+            <p:cNvPr id="26" name="Retângulo: Cantos Arredondados 13">
+              <a:extLst>
+                <a:ext uri="{FF2B5EF4-FFF2-40B4-BE49-F238E27FC236}">
+                  <a16:creationId xmlns:a16="http://schemas.microsoft.com/office/drawing/2014/main" id="{BA87640D-12B5-4A1A-88C7-C53269C56734}"/>
+                </a:ext>
+              </a:extLst>
+            </p:cNvPr>
+            <p:cNvSpPr/>
+            <p:nvPr/>
+          </p:nvSpPr>
+          <p:spPr>
+            <a:xfrm>
+              <a:off x="293914" y="559254"/>
+              <a:ext cx="2367643" cy="2428875"/>
+            </a:xfrm>
+            <a:prstGeom prst="roundRect">
+              <a:avLst/>
+            </a:prstGeom>
+          </p:spPr>
+          <p:style>
+            <a:lnRef idx="1">
+              <a:schemeClr val="accent3"/>
+            </a:lnRef>
+            <a:fillRef idx="2">
+              <a:schemeClr val="accent3"/>
+            </a:fillRef>
+            <a:effectRef idx="1">
+              <a:schemeClr val="accent3"/>
+            </a:effectRef>
+            <a:fontRef idx="minor">
+              <a:schemeClr val="dk1"/>
+            </a:fontRef>
+          </p:style>
+          <p:txBody>
+            <a:bodyPr rtlCol="0" anchor="ctr"/>
+            <a:lstStyle/>
+            <a:p>
+              <a:pPr algn="ctr"/>
+              <a:r>
+                <a:rPr lang="pt-BR" dirty="0"/>
+                <a:t>Eu enquanto </a:t>
+              </a:r>
+              <a:r>
+                <a:rPr lang="pt-BR" dirty="0" smtClean="0"/>
+                <a:t>cliente quero ter 99% disponibilidade para não ocorrer falhas de processo</a:t>
+              </a:r>
+              <a:endParaRPr lang="pt-BR" dirty="0"/>
+            </a:p>
+          </p:txBody>
+        </p:sp>
+        <p:pic>
+          <p:nvPicPr>
+            <p:cNvPr id="27" name="Picture 4" descr="Usuário Pessoa Pessoas - Gráfico vetorial grátis no Pixabay">
+              <a:extLst>
+                <a:ext uri="{FF2B5EF4-FFF2-40B4-BE49-F238E27FC236}">
+                  <a16:creationId xmlns:a16="http://schemas.microsoft.com/office/drawing/2014/main" id="{7F7A0B22-8101-4250-9466-6D307C3D75C2}"/>
+                </a:ext>
+              </a:extLst>
+            </p:cNvPr>
+            <p:cNvPicPr>
+              <a:picLocks noChangeAspect="1" noChangeArrowheads="1"/>
+            </p:cNvPicPr>
+            <p:nvPr/>
+          </p:nvPicPr>
+          <p:blipFill>
+            <a:blip r:embed="rId2" cstate="hqprint">
+              <a:extLst>
+                <a:ext uri="{28A0092B-C50C-407E-A947-70E740481C1C}">
+                  <a14:useLocalDpi xmlns:a14="http://schemas.microsoft.com/office/drawing/2010/main" val="0"/>
+                </a:ext>
+              </a:extLst>
+            </a:blip>
+            <a:srcRect/>
+            <a:stretch>
+              <a:fillRect/>
+            </a:stretch>
+          </p:blipFill>
+          <p:spPr bwMode="auto">
+            <a:xfrm>
+              <a:off x="1091292" y="196964"/>
+              <a:ext cx="772885" cy="724579"/>
+            </a:xfrm>
+            <a:prstGeom prst="rect">
+              <a:avLst/>
+            </a:prstGeom>
+            <a:noFill/>
+            <a:extLst>
+              <a:ext uri="{909E8E84-426E-40DD-AFC4-6F175D3DCCD1}">
+                <a14:hiddenFill xmlns:a14="http://schemas.microsoft.com/office/drawing/2010/main">
+                  <a:solidFill>
+                    <a:srgbClr val="FFFFFF"/>
+                  </a:solidFill>
+                </a14:hiddenFill>
+              </a:ext>
+            </a:extLst>
+          </p:spPr>
+        </p:pic>
+      </p:grpSp>
+    </p:spTree>
+    <p:extLst>
+      <p:ext uri="{BB962C8B-B14F-4D97-AF65-F5344CB8AC3E}">
+        <p14:creationId xmlns:p14="http://schemas.microsoft.com/office/powerpoint/2010/main" val="2262909912"/>
       </p:ext>
     </p:extLst>
   </p:cSld>

</xml_diff>